<commit_message>
italics replaced in notebook, Andre added to pptx
</commit_message>
<xml_diff>
--- a/BMDSD.pptx
+++ b/BMDSD.pptx
@@ -9294,7 +9294,7 @@
           <a:p>
             <a:fld id="{44BEF8D8-DC87-4C47-9667-FD2E5AD6DCC9}" type="datetimeFigureOut">
               <a:rPr lang="en-US" smtClean="0"/>
-              <a:t>1/29/20</a:t>
+              <a:t>2/3/20</a:t>
             </a:fld>
             <a:endParaRPr lang="en-US"/>
           </a:p>
@@ -10521,7 +10521,7 @@
           <a:p>
             <a:fld id="{EA0C0817-A112-4847-8014-A94B7D2A4EA3}" type="datetime1">
               <a:rPr lang="en-US" smtClean="0"/>
-              <a:t>1/29/20</a:t>
+              <a:t>2/3/20</a:t>
             </a:fld>
             <a:endParaRPr lang="en-US" dirty="0"/>
           </a:p>
@@ -10723,7 +10723,7 @@
           <a:p>
             <a:fld id="{134F40B7-36AB-4376-BE14-EF7004D79BB9}" type="datetime1">
               <a:rPr lang="en-US" smtClean="0"/>
-              <a:t>1/29/20</a:t>
+              <a:t>2/3/20</a:t>
             </a:fld>
             <a:endParaRPr lang="en-US"/>
           </a:p>
@@ -10903,7 +10903,7 @@
           <a:p>
             <a:fld id="{FF87CAB8-DCAE-46A5-AADA-B3FAD11A54E0}" type="datetime1">
               <a:rPr lang="en-US" smtClean="0"/>
-              <a:t>1/29/20</a:t>
+              <a:t>2/3/20</a:t>
             </a:fld>
             <a:endParaRPr lang="en-US"/>
           </a:p>
@@ -11073,7 +11073,7 @@
           <a:p>
             <a:fld id="{7332B432-ACDA-4023-A761-2BAB76577B62}" type="datetime1">
               <a:rPr lang="en-US" smtClean="0"/>
-              <a:t>1/29/20</a:t>
+              <a:t>2/3/20</a:t>
             </a:fld>
             <a:endParaRPr lang="en-US"/>
           </a:p>
@@ -11672,7 +11672,7 @@
           <a:p>
             <a:fld id="{D9C646AA-F36E-4540-911D-FFFC0A0EF24A}" type="datetime1">
               <a:rPr lang="en-US" smtClean="0"/>
-              <a:t>1/29/20</a:t>
+              <a:t>2/3/20</a:t>
             </a:fld>
             <a:endParaRPr lang="en-US" dirty="0"/>
           </a:p>
@@ -11992,7 +11992,7 @@
           <a:p>
             <a:fld id="{69186D26-FA5F-4637-B602-B7C2DC34CFD4}" type="datetime1">
               <a:rPr lang="en-US" smtClean="0"/>
-              <a:t>1/29/20</a:t>
+              <a:t>2/3/20</a:t>
             </a:fld>
             <a:endParaRPr lang="en-US"/>
           </a:p>
@@ -12427,7 +12427,7 @@
           <a:p>
             <a:fld id="{8A7F15D8-96D1-4781-BC50-CA8A088B2FE4}" type="datetime1">
               <a:rPr lang="en-US" smtClean="0"/>
-              <a:t>1/29/20</a:t>
+              <a:t>2/3/20</a:t>
             </a:fld>
             <a:endParaRPr lang="en-US"/>
           </a:p>
@@ -12545,7 +12545,7 @@
           <a:p>
             <a:fld id="{F9A96C99-B8F8-4528-BD05-0E16E943DC09}" type="datetime1">
               <a:rPr lang="en-US" smtClean="0"/>
-              <a:t>1/29/20</a:t>
+              <a:t>2/3/20</a:t>
             </a:fld>
             <a:endParaRPr lang="en-US"/>
           </a:p>
@@ -12640,7 +12640,7 @@
           <a:p>
             <a:fld id="{03636942-C211-4B28-8DBD-C953E00AF71B}" type="datetime1">
               <a:rPr lang="en-US" smtClean="0"/>
-              <a:t>1/29/20</a:t>
+              <a:t>2/3/20</a:t>
             </a:fld>
             <a:endParaRPr lang="en-US"/>
           </a:p>
@@ -13057,7 +13057,7 @@
           <a:p>
             <a:fld id="{7E8D12A6-918A-48BD-8CB9-CA713993B0EA}" type="datetime1">
               <a:rPr lang="en-US" smtClean="0"/>
-              <a:t>1/29/20</a:t>
+              <a:t>2/3/20</a:t>
             </a:fld>
             <a:endParaRPr lang="en-US"/>
           </a:p>
@@ -13319,7 +13319,7 @@
             <a:fld id="{E778CE86-875F-4587-BCF6-FA054AFC0D53}" type="datetime1">
               <a:rPr lang="en-US" smtClean="0"/>
               <a:pPr/>
-              <a:t>1/29/20</a:t>
+              <a:t>2/3/20</a:t>
             </a:fld>
             <a:endParaRPr lang="en-US" dirty="0"/>
           </a:p>
@@ -13835,7 +13835,7 @@
           <a:p>
             <a:fld id="{F6FA2B21-3FCD-4721-B95C-427943F61125}" type="datetime1">
               <a:rPr lang="en-US" smtClean="0"/>
-              <a:t>1/29/20</a:t>
+              <a:t>2/3/20</a:t>
             </a:fld>
             <a:endParaRPr lang="en-US"/>
           </a:p>
@@ -14448,7 +14448,7 @@
         </p:nvSpPr>
         <p:spPr>
           <a:xfrm>
-            <a:off x="1276055" y="2350017"/>
+            <a:off x="1276055" y="2107121"/>
             <a:ext cx="4775075" cy="1630906"/>
           </a:xfrm>
         </p:spPr>
@@ -14487,7 +14487,7 @@
         </p:nvSpPr>
         <p:spPr>
           <a:xfrm>
-            <a:off x="1276055" y="3990546"/>
+            <a:off x="1276055" y="3733362"/>
             <a:ext cx="4775075" cy="559656"/>
           </a:xfrm>
         </p:spPr>
@@ -14504,7 +14504,36 @@
                 </a:solidFill>
                 <a:latin typeface="Arial Nova" panose="020F0502020204030204" pitchFamily="34" charset="0"/>
               </a:rPr>
-              <a:t>Colby Witherup Wood</a:t>
+              <a:t>Colby </a:t>
+            </a:r>
+            <a:r>
+              <a:rPr lang="en-US" sz="2000" dirty="0" err="1">
+                <a:solidFill>
+                  <a:schemeClr val="tx1"/>
+                </a:solidFill>
+                <a:latin typeface="Arial Nova" panose="020F0502020204030204" pitchFamily="34" charset="0"/>
+              </a:rPr>
+              <a:t>Witherup</a:t>
+            </a:r>
+            <a:r>
+              <a:rPr lang="en-US" sz="2000" dirty="0">
+                <a:solidFill>
+                  <a:schemeClr val="tx1"/>
+                </a:solidFill>
+                <a:latin typeface="Arial Nova" panose="020F0502020204030204" pitchFamily="34" charset="0"/>
+              </a:rPr>
+              <a:t> Wood</a:t>
+            </a:r>
+          </a:p>
+          <a:p>
+            <a:r>
+              <a:rPr lang="en-US" sz="2000" dirty="0">
+                <a:solidFill>
+                  <a:schemeClr val="tx1"/>
+                </a:solidFill>
+                <a:latin typeface="Arial Nova" panose="020F0502020204030204" pitchFamily="34" charset="0"/>
+              </a:rPr>
+              <a:t>Presented by Andre Archer</a:t>
             </a:r>
           </a:p>
           <a:p>

</xml_diff>